<commit_message>
last change fur presentation
</commit_message>
<xml_diff>
--- a/Prasentation/raytracing.pptx
+++ b/Prasentation/raytracing.pptx
@@ -163,7 +163,7 @@
           <p:cNvPr id="2" name="Header Placeholder 1">
             <a:extLst>
               <a:ext uri="{FF2B5EF4-FFF2-40B4-BE49-F238E27FC236}">
-                <a16:creationId xmlns:a16="http://schemas.microsoft.com/office/drawing/2014/main" xmlns="" id="{B79BFBC2-2198-46A3-9EB2-B81AB4467CA0}"/>
+                <a16:creationId xmlns="" xmlns:a16="http://schemas.microsoft.com/office/drawing/2014/main" id="{B79BFBC2-2198-46A3-9EB2-B81AB4467CA0}"/>
               </a:ext>
             </a:extLst>
           </p:cNvPr>
@@ -200,7 +200,7 @@
           <p:cNvPr id="3" name="Date Placeholder 2">
             <a:extLst>
               <a:ext uri="{FF2B5EF4-FFF2-40B4-BE49-F238E27FC236}">
-                <a16:creationId xmlns:a16="http://schemas.microsoft.com/office/drawing/2014/main" xmlns="" id="{FF91BC7E-0C72-4340-BC40-CB9D7AD0A642}"/>
+                <a16:creationId xmlns="" xmlns:a16="http://schemas.microsoft.com/office/drawing/2014/main" id="{FF91BC7E-0C72-4340-BC40-CB9D7AD0A642}"/>
               </a:ext>
             </a:extLst>
           </p:cNvPr>
@@ -230,7 +230,7 @@
           <a:p>
             <a:fld id="{727CB3D3-9682-4CBA-94E8-ED2846373387}" type="datetimeFigureOut">
               <a:rPr lang="en-IN" smtClean="0"/>
-              <a:t>11-09-2018</a:t>
+              <a:t>12-09-2018</a:t>
             </a:fld>
             <a:endParaRPr lang="en-IN"/>
           </a:p>
@@ -241,7 +241,7 @@
           <p:cNvPr id="4" name="Footer Placeholder 3">
             <a:extLst>
               <a:ext uri="{FF2B5EF4-FFF2-40B4-BE49-F238E27FC236}">
-                <a16:creationId xmlns:a16="http://schemas.microsoft.com/office/drawing/2014/main" xmlns="" id="{A4C512CF-A139-416E-8EB7-8606C4564733}"/>
+                <a16:creationId xmlns="" xmlns:a16="http://schemas.microsoft.com/office/drawing/2014/main" id="{A4C512CF-A139-416E-8EB7-8606C4564733}"/>
               </a:ext>
             </a:extLst>
           </p:cNvPr>
@@ -278,7 +278,7 @@
           <p:cNvPr id="5" name="Slide Number Placeholder 4">
             <a:extLst>
               <a:ext uri="{FF2B5EF4-FFF2-40B4-BE49-F238E27FC236}">
-                <a16:creationId xmlns:a16="http://schemas.microsoft.com/office/drawing/2014/main" xmlns="" id="{35FEFB71-1A06-49BD-B2F6-901B54BDF87E}"/>
+                <a16:creationId xmlns="" xmlns:a16="http://schemas.microsoft.com/office/drawing/2014/main" id="{35FEFB71-1A06-49BD-B2F6-901B54BDF87E}"/>
               </a:ext>
             </a:extLst>
           </p:cNvPr>
@@ -407,7 +407,7 @@
           <a:p>
             <a:fld id="{1786D931-9A6C-4305-A044-6E643877EFD7}" type="datetimeFigureOut">
               <a:rPr lang="en-IN" smtClean="0"/>
-              <a:t>11-09-2018</a:t>
+              <a:t>12-09-2018</a:t>
             </a:fld>
             <a:endParaRPr lang="en-IN"/>
           </a:p>
@@ -697,7 +697,7 @@
           <p:cNvPr id="2" name="Title 1">
             <a:extLst>
               <a:ext uri="{FF2B5EF4-FFF2-40B4-BE49-F238E27FC236}">
-                <a16:creationId xmlns:a16="http://schemas.microsoft.com/office/drawing/2014/main" xmlns="" id="{E5BC5933-1ACE-460A-8B06-9C453B038B62}"/>
+                <a16:creationId xmlns="" xmlns:a16="http://schemas.microsoft.com/office/drawing/2014/main" id="{E5BC5933-1ACE-460A-8B06-9C453B038B62}"/>
               </a:ext>
             </a:extLst>
           </p:cNvPr>
@@ -735,7 +735,7 @@
           <p:cNvPr id="3" name="Subtitle 2">
             <a:extLst>
               <a:ext uri="{FF2B5EF4-FFF2-40B4-BE49-F238E27FC236}">
-                <a16:creationId xmlns:a16="http://schemas.microsoft.com/office/drawing/2014/main" xmlns="" id="{DD7FD7A1-B949-4B22-98AB-2D7ED90B1F4B}"/>
+                <a16:creationId xmlns="" xmlns:a16="http://schemas.microsoft.com/office/drawing/2014/main" id="{DD7FD7A1-B949-4B22-98AB-2D7ED90B1F4B}"/>
               </a:ext>
             </a:extLst>
           </p:cNvPr>
@@ -806,7 +806,7 @@
           <p:cNvPr id="4" name="Date Placeholder 3">
             <a:extLst>
               <a:ext uri="{FF2B5EF4-FFF2-40B4-BE49-F238E27FC236}">
-                <a16:creationId xmlns:a16="http://schemas.microsoft.com/office/drawing/2014/main" xmlns="" id="{0AAB9891-5781-44DE-B496-2AD7FEFCE2D5}"/>
+                <a16:creationId xmlns="" xmlns:a16="http://schemas.microsoft.com/office/drawing/2014/main" id="{0AAB9891-5781-44DE-B496-2AD7FEFCE2D5}"/>
               </a:ext>
             </a:extLst>
           </p:cNvPr>
@@ -824,7 +824,7 @@
           <a:p>
             <a:fld id="{38D69507-EEEA-4964-AC41-89F1B619239D}" type="datetime1">
               <a:rPr lang="en-US" smtClean="0"/>
-              <a:t>9/11/2018</a:t>
+              <a:t>9/12/2018</a:t>
             </a:fld>
             <a:endParaRPr lang="en-IN"/>
           </a:p>
@@ -835,7 +835,7 @@
           <p:cNvPr id="5" name="Footer Placeholder 4">
             <a:extLst>
               <a:ext uri="{FF2B5EF4-FFF2-40B4-BE49-F238E27FC236}">
-                <a16:creationId xmlns:a16="http://schemas.microsoft.com/office/drawing/2014/main" xmlns="" id="{F1C5BAB4-EC6F-4ADA-AA33-DCA7F62B076C}"/>
+                <a16:creationId xmlns="" xmlns:a16="http://schemas.microsoft.com/office/drawing/2014/main" id="{F1C5BAB4-EC6F-4ADA-AA33-DCA7F62B076C}"/>
               </a:ext>
             </a:extLst>
           </p:cNvPr>
@@ -863,7 +863,7 @@
           <p:cNvPr id="6" name="Slide Number Placeholder 5">
             <a:extLst>
               <a:ext uri="{FF2B5EF4-FFF2-40B4-BE49-F238E27FC236}">
-                <a16:creationId xmlns:a16="http://schemas.microsoft.com/office/drawing/2014/main" xmlns="" id="{77F8F9D2-4D22-47B0-BFD8-D11A180213AB}"/>
+                <a16:creationId xmlns="" xmlns:a16="http://schemas.microsoft.com/office/drawing/2014/main" id="{77F8F9D2-4D22-47B0-BFD8-D11A180213AB}"/>
               </a:ext>
             </a:extLst>
           </p:cNvPr>
@@ -922,7 +922,7 @@
           <p:cNvPr id="2" name="Title 1">
             <a:extLst>
               <a:ext uri="{FF2B5EF4-FFF2-40B4-BE49-F238E27FC236}">
-                <a16:creationId xmlns:a16="http://schemas.microsoft.com/office/drawing/2014/main" xmlns="" id="{E852BE02-349F-4AF0-A7C6-D687E30FF08C}"/>
+                <a16:creationId xmlns="" xmlns:a16="http://schemas.microsoft.com/office/drawing/2014/main" id="{E852BE02-349F-4AF0-A7C6-D687E30FF08C}"/>
               </a:ext>
             </a:extLst>
           </p:cNvPr>
@@ -951,7 +951,7 @@
           <p:cNvPr id="3" name="Vertical Text Placeholder 2">
             <a:extLst>
               <a:ext uri="{FF2B5EF4-FFF2-40B4-BE49-F238E27FC236}">
-                <a16:creationId xmlns:a16="http://schemas.microsoft.com/office/drawing/2014/main" xmlns="" id="{6F78F0CD-1C88-4713-B96F-10A7B0FBADCE}"/>
+                <a16:creationId xmlns="" xmlns:a16="http://schemas.microsoft.com/office/drawing/2014/main" id="{6F78F0CD-1C88-4713-B96F-10A7B0FBADCE}"/>
               </a:ext>
             </a:extLst>
           </p:cNvPr>
@@ -1009,7 +1009,7 @@
           <p:cNvPr id="4" name="Date Placeholder 3">
             <a:extLst>
               <a:ext uri="{FF2B5EF4-FFF2-40B4-BE49-F238E27FC236}">
-                <a16:creationId xmlns:a16="http://schemas.microsoft.com/office/drawing/2014/main" xmlns="" id="{26309E75-ACA3-4242-9F10-53E337E3F519}"/>
+                <a16:creationId xmlns="" xmlns:a16="http://schemas.microsoft.com/office/drawing/2014/main" id="{26309E75-ACA3-4242-9F10-53E337E3F519}"/>
               </a:ext>
             </a:extLst>
           </p:cNvPr>
@@ -1027,7 +1027,7 @@
           <a:p>
             <a:fld id="{4E9420F1-ECC8-4A62-B4FE-4F0906A849DF}" type="datetime1">
               <a:rPr lang="en-US" smtClean="0"/>
-              <a:t>9/11/2018</a:t>
+              <a:t>9/12/2018</a:t>
             </a:fld>
             <a:endParaRPr lang="en-IN"/>
           </a:p>
@@ -1038,7 +1038,7 @@
           <p:cNvPr id="5" name="Footer Placeholder 4">
             <a:extLst>
               <a:ext uri="{FF2B5EF4-FFF2-40B4-BE49-F238E27FC236}">
-                <a16:creationId xmlns:a16="http://schemas.microsoft.com/office/drawing/2014/main" xmlns="" id="{6D34FAF4-ACC9-4C2E-AA31-742B533C24ED}"/>
+                <a16:creationId xmlns="" xmlns:a16="http://schemas.microsoft.com/office/drawing/2014/main" id="{6D34FAF4-ACC9-4C2E-AA31-742B533C24ED}"/>
               </a:ext>
             </a:extLst>
           </p:cNvPr>
@@ -1066,7 +1066,7 @@
           <p:cNvPr id="6" name="Slide Number Placeholder 5">
             <a:extLst>
               <a:ext uri="{FF2B5EF4-FFF2-40B4-BE49-F238E27FC236}">
-                <a16:creationId xmlns:a16="http://schemas.microsoft.com/office/drawing/2014/main" xmlns="" id="{159A4F07-AD1F-4D49-B455-3BEAA12454C8}"/>
+                <a16:creationId xmlns="" xmlns:a16="http://schemas.microsoft.com/office/drawing/2014/main" id="{159A4F07-AD1F-4D49-B455-3BEAA12454C8}"/>
               </a:ext>
             </a:extLst>
           </p:cNvPr>
@@ -1125,7 +1125,7 @@
           <p:cNvPr id="2" name="Vertical Title 1">
             <a:extLst>
               <a:ext uri="{FF2B5EF4-FFF2-40B4-BE49-F238E27FC236}">
-                <a16:creationId xmlns:a16="http://schemas.microsoft.com/office/drawing/2014/main" xmlns="" id="{573F6228-C5DC-43A0-BC0C-0609ACE4AD70}"/>
+                <a16:creationId xmlns="" xmlns:a16="http://schemas.microsoft.com/office/drawing/2014/main" id="{573F6228-C5DC-43A0-BC0C-0609ACE4AD70}"/>
               </a:ext>
             </a:extLst>
           </p:cNvPr>
@@ -1159,7 +1159,7 @@
           <p:cNvPr id="3" name="Vertical Text Placeholder 2">
             <a:extLst>
               <a:ext uri="{FF2B5EF4-FFF2-40B4-BE49-F238E27FC236}">
-                <a16:creationId xmlns:a16="http://schemas.microsoft.com/office/drawing/2014/main" xmlns="" id="{5ABB8ECC-87EF-4A64-ABCD-EF659B3DEF1B}"/>
+                <a16:creationId xmlns="" xmlns:a16="http://schemas.microsoft.com/office/drawing/2014/main" id="{5ABB8ECC-87EF-4A64-ABCD-EF659B3DEF1B}"/>
               </a:ext>
             </a:extLst>
           </p:cNvPr>
@@ -1222,7 +1222,7 @@
           <p:cNvPr id="4" name="Date Placeholder 3">
             <a:extLst>
               <a:ext uri="{FF2B5EF4-FFF2-40B4-BE49-F238E27FC236}">
-                <a16:creationId xmlns:a16="http://schemas.microsoft.com/office/drawing/2014/main" xmlns="" id="{7DFC8D55-DDE8-4EA8-9EB7-78595B31F798}"/>
+                <a16:creationId xmlns="" xmlns:a16="http://schemas.microsoft.com/office/drawing/2014/main" id="{7DFC8D55-DDE8-4EA8-9EB7-78595B31F798}"/>
               </a:ext>
             </a:extLst>
           </p:cNvPr>
@@ -1240,7 +1240,7 @@
           <a:p>
             <a:fld id="{6D344871-4617-4FB3-9444-5D41983529EF}" type="datetime1">
               <a:rPr lang="en-US" smtClean="0"/>
-              <a:t>9/11/2018</a:t>
+              <a:t>9/12/2018</a:t>
             </a:fld>
             <a:endParaRPr lang="en-IN" dirty="0"/>
           </a:p>
@@ -1251,7 +1251,7 @@
           <p:cNvPr id="5" name="Footer Placeholder 4">
             <a:extLst>
               <a:ext uri="{FF2B5EF4-FFF2-40B4-BE49-F238E27FC236}">
-                <a16:creationId xmlns:a16="http://schemas.microsoft.com/office/drawing/2014/main" xmlns="" id="{CDA0D7D7-AEFD-48A8-82E8-9F3577F70CDB}"/>
+                <a16:creationId xmlns="" xmlns:a16="http://schemas.microsoft.com/office/drawing/2014/main" id="{CDA0D7D7-AEFD-48A8-82E8-9F3577F70CDB}"/>
               </a:ext>
             </a:extLst>
           </p:cNvPr>
@@ -1279,7 +1279,7 @@
           <p:cNvPr id="6" name="Slide Number Placeholder 5">
             <a:extLst>
               <a:ext uri="{FF2B5EF4-FFF2-40B4-BE49-F238E27FC236}">
-                <a16:creationId xmlns:a16="http://schemas.microsoft.com/office/drawing/2014/main" xmlns="" id="{30008636-19B9-4A6E-848A-BF06D8D7C3E2}"/>
+                <a16:creationId xmlns="" xmlns:a16="http://schemas.microsoft.com/office/drawing/2014/main" id="{30008636-19B9-4A6E-848A-BF06D8D7C3E2}"/>
               </a:ext>
             </a:extLst>
           </p:cNvPr>
@@ -1338,7 +1338,7 @@
           <p:cNvPr id="2" name="Title 1">
             <a:extLst>
               <a:ext uri="{FF2B5EF4-FFF2-40B4-BE49-F238E27FC236}">
-                <a16:creationId xmlns:a16="http://schemas.microsoft.com/office/drawing/2014/main" xmlns="" id="{F24437D7-4D3B-4254-AF22-BD6028D4A2AA}"/>
+                <a16:creationId xmlns="" xmlns:a16="http://schemas.microsoft.com/office/drawing/2014/main" id="{F24437D7-4D3B-4254-AF22-BD6028D4A2AA}"/>
               </a:ext>
             </a:extLst>
           </p:cNvPr>
@@ -1367,7 +1367,7 @@
           <p:cNvPr id="3" name="Date Placeholder 2">
             <a:extLst>
               <a:ext uri="{FF2B5EF4-FFF2-40B4-BE49-F238E27FC236}">
-                <a16:creationId xmlns:a16="http://schemas.microsoft.com/office/drawing/2014/main" xmlns="" id="{0983D8D3-69CB-453B-A1B2-A1A4AF30BB91}"/>
+                <a16:creationId xmlns="" xmlns:a16="http://schemas.microsoft.com/office/drawing/2014/main" id="{0983D8D3-69CB-453B-A1B2-A1A4AF30BB91}"/>
               </a:ext>
             </a:extLst>
           </p:cNvPr>
@@ -1407,7 +1407,7 @@
                   </a:schemeClr>
                 </a:solidFill>
               </a:rPr>
-              <a:t>9/11/2018</a:t>
+              <a:t>9/12/2018</a:t>
             </a:fld>
             <a:endParaRPr lang="en-IN" dirty="0">
               <a:solidFill>
@@ -1425,7 +1425,7 @@
           <p:cNvPr id="4" name="Footer Placeholder 3">
             <a:extLst>
               <a:ext uri="{FF2B5EF4-FFF2-40B4-BE49-F238E27FC236}">
-                <a16:creationId xmlns:a16="http://schemas.microsoft.com/office/drawing/2014/main" xmlns="" id="{54C28752-9E2E-41FD-8AFB-7C3BC0EB2744}"/>
+                <a16:creationId xmlns="" xmlns:a16="http://schemas.microsoft.com/office/drawing/2014/main" id="{54C28752-9E2E-41FD-8AFB-7C3BC0EB2744}"/>
               </a:ext>
             </a:extLst>
           </p:cNvPr>
@@ -1485,7 +1485,7 @@
           <p:cNvPr id="8" name="Straight Connector 7">
             <a:extLst>
               <a:ext uri="{FF2B5EF4-FFF2-40B4-BE49-F238E27FC236}">
-                <a16:creationId xmlns:a16="http://schemas.microsoft.com/office/drawing/2014/main" xmlns="" id="{5E6E1919-081F-4F3A-A8D9-1A7B4644E713}"/>
+                <a16:creationId xmlns="" xmlns:a16="http://schemas.microsoft.com/office/drawing/2014/main" id="{5E6E1919-081F-4F3A-A8D9-1A7B4644E713}"/>
               </a:ext>
             </a:extLst>
           </p:cNvPr>
@@ -1524,7 +1524,7 @@
           <p:cNvPr id="10" name="Date Placeholder 2">
             <a:extLst>
               <a:ext uri="{FF2B5EF4-FFF2-40B4-BE49-F238E27FC236}">
-                <a16:creationId xmlns:a16="http://schemas.microsoft.com/office/drawing/2014/main" xmlns="" id="{E00F0969-157C-4AE6-B3F2-76049D02A109}"/>
+                <a16:creationId xmlns="" xmlns:a16="http://schemas.microsoft.com/office/drawing/2014/main" id="{E00F0969-157C-4AE6-B3F2-76049D02A109}"/>
               </a:ext>
             </a:extLst>
           </p:cNvPr>
@@ -1704,7 +1704,7 @@
           <p:cNvPr id="2" name="Title 1">
             <a:extLst>
               <a:ext uri="{FF2B5EF4-FFF2-40B4-BE49-F238E27FC236}">
-                <a16:creationId xmlns:a16="http://schemas.microsoft.com/office/drawing/2014/main" xmlns="" id="{AC7531F7-58A9-40B7-9D74-8809AC614BB7}"/>
+                <a16:creationId xmlns="" xmlns:a16="http://schemas.microsoft.com/office/drawing/2014/main" id="{AC7531F7-58A9-40B7-9D74-8809AC614BB7}"/>
               </a:ext>
             </a:extLst>
           </p:cNvPr>
@@ -1733,7 +1733,7 @@
           <p:cNvPr id="3" name="Content Placeholder 2">
             <a:extLst>
               <a:ext uri="{FF2B5EF4-FFF2-40B4-BE49-F238E27FC236}">
-                <a16:creationId xmlns:a16="http://schemas.microsoft.com/office/drawing/2014/main" xmlns="" id="{A6487D5B-C3D2-43B4-804F-EC97B7520B58}"/>
+                <a16:creationId xmlns="" xmlns:a16="http://schemas.microsoft.com/office/drawing/2014/main" id="{A6487D5B-C3D2-43B4-804F-EC97B7520B58}"/>
               </a:ext>
             </a:extLst>
           </p:cNvPr>
@@ -1791,7 +1791,7 @@
           <p:cNvPr id="4" name="Date Placeholder 3">
             <a:extLst>
               <a:ext uri="{FF2B5EF4-FFF2-40B4-BE49-F238E27FC236}">
-                <a16:creationId xmlns:a16="http://schemas.microsoft.com/office/drawing/2014/main" xmlns="" id="{93D59530-7A8F-4CD7-B8B2-B0B957B28EF0}"/>
+                <a16:creationId xmlns="" xmlns:a16="http://schemas.microsoft.com/office/drawing/2014/main" id="{93D59530-7A8F-4CD7-B8B2-B0B957B28EF0}"/>
               </a:ext>
             </a:extLst>
           </p:cNvPr>
@@ -1809,7 +1809,7 @@
           <a:p>
             <a:fld id="{9C93AF68-106E-4554-A295-DF583C47C4C5}" type="datetime1">
               <a:rPr lang="en-US" smtClean="0"/>
-              <a:t>9/11/2018</a:t>
+              <a:t>9/12/2018</a:t>
             </a:fld>
             <a:endParaRPr lang="en-IN"/>
           </a:p>
@@ -1820,7 +1820,7 @@
           <p:cNvPr id="5" name="Footer Placeholder 4">
             <a:extLst>
               <a:ext uri="{FF2B5EF4-FFF2-40B4-BE49-F238E27FC236}">
-                <a16:creationId xmlns:a16="http://schemas.microsoft.com/office/drawing/2014/main" xmlns="" id="{352C0661-BC9D-4B8E-A94C-BFD488A3E8E9}"/>
+                <a16:creationId xmlns="" xmlns:a16="http://schemas.microsoft.com/office/drawing/2014/main" id="{352C0661-BC9D-4B8E-A94C-BFD488A3E8E9}"/>
               </a:ext>
             </a:extLst>
           </p:cNvPr>
@@ -1848,7 +1848,7 @@
           <p:cNvPr id="6" name="Slide Number Placeholder 5">
             <a:extLst>
               <a:ext uri="{FF2B5EF4-FFF2-40B4-BE49-F238E27FC236}">
-                <a16:creationId xmlns:a16="http://schemas.microsoft.com/office/drawing/2014/main" xmlns="" id="{1FD04A23-3071-41D6-96F9-BE13738682D8}"/>
+                <a16:creationId xmlns="" xmlns:a16="http://schemas.microsoft.com/office/drawing/2014/main" id="{1FD04A23-3071-41D6-96F9-BE13738682D8}"/>
               </a:ext>
             </a:extLst>
           </p:cNvPr>
@@ -1907,7 +1907,7 @@
           <p:cNvPr id="2" name="Title 1">
             <a:extLst>
               <a:ext uri="{FF2B5EF4-FFF2-40B4-BE49-F238E27FC236}">
-                <a16:creationId xmlns:a16="http://schemas.microsoft.com/office/drawing/2014/main" xmlns="" id="{19DD5A87-D79F-4245-95E2-D7B778EAA7CA}"/>
+                <a16:creationId xmlns="" xmlns:a16="http://schemas.microsoft.com/office/drawing/2014/main" id="{19DD5A87-D79F-4245-95E2-D7B778EAA7CA}"/>
               </a:ext>
             </a:extLst>
           </p:cNvPr>
@@ -1945,7 +1945,7 @@
           <p:cNvPr id="3" name="Text Placeholder 2">
             <a:extLst>
               <a:ext uri="{FF2B5EF4-FFF2-40B4-BE49-F238E27FC236}">
-                <a16:creationId xmlns:a16="http://schemas.microsoft.com/office/drawing/2014/main" xmlns="" id="{9835C8A4-B9DC-4126-8508-3AB17BB85594}"/>
+                <a16:creationId xmlns="" xmlns:a16="http://schemas.microsoft.com/office/drawing/2014/main" id="{9835C8A4-B9DC-4126-8508-3AB17BB85594}"/>
               </a:ext>
             </a:extLst>
           </p:cNvPr>
@@ -2070,7 +2070,7 @@
           <p:cNvPr id="4" name="Date Placeholder 3">
             <a:extLst>
               <a:ext uri="{FF2B5EF4-FFF2-40B4-BE49-F238E27FC236}">
-                <a16:creationId xmlns:a16="http://schemas.microsoft.com/office/drawing/2014/main" xmlns="" id="{B63F5ED3-888B-44D8-AEA3-760C5E03C503}"/>
+                <a16:creationId xmlns="" xmlns:a16="http://schemas.microsoft.com/office/drawing/2014/main" id="{B63F5ED3-888B-44D8-AEA3-760C5E03C503}"/>
               </a:ext>
             </a:extLst>
           </p:cNvPr>
@@ -2088,7 +2088,7 @@
           <a:p>
             <a:fld id="{4349FF82-B85A-4F04-B66A-EE752464CB47}" type="datetime1">
               <a:rPr lang="en-US" smtClean="0"/>
-              <a:t>9/11/2018</a:t>
+              <a:t>9/12/2018</a:t>
             </a:fld>
             <a:endParaRPr lang="en-IN"/>
           </a:p>
@@ -2099,7 +2099,7 @@
           <p:cNvPr id="5" name="Footer Placeholder 4">
             <a:extLst>
               <a:ext uri="{FF2B5EF4-FFF2-40B4-BE49-F238E27FC236}">
-                <a16:creationId xmlns:a16="http://schemas.microsoft.com/office/drawing/2014/main" xmlns="" id="{8F5B650E-833B-49D6-9601-855398677C8F}"/>
+                <a16:creationId xmlns="" xmlns:a16="http://schemas.microsoft.com/office/drawing/2014/main" id="{8F5B650E-833B-49D6-9601-855398677C8F}"/>
               </a:ext>
             </a:extLst>
           </p:cNvPr>
@@ -2127,7 +2127,7 @@
           <p:cNvPr id="6" name="Slide Number Placeholder 5">
             <a:extLst>
               <a:ext uri="{FF2B5EF4-FFF2-40B4-BE49-F238E27FC236}">
-                <a16:creationId xmlns:a16="http://schemas.microsoft.com/office/drawing/2014/main" xmlns="" id="{ADE76E39-7854-44CF-B5EF-1A018E2CA182}"/>
+                <a16:creationId xmlns="" xmlns:a16="http://schemas.microsoft.com/office/drawing/2014/main" id="{ADE76E39-7854-44CF-B5EF-1A018E2CA182}"/>
               </a:ext>
             </a:extLst>
           </p:cNvPr>
@@ -2186,7 +2186,7 @@
           <p:cNvPr id="2" name="Title 1">
             <a:extLst>
               <a:ext uri="{FF2B5EF4-FFF2-40B4-BE49-F238E27FC236}">
-                <a16:creationId xmlns:a16="http://schemas.microsoft.com/office/drawing/2014/main" xmlns="" id="{01CD7055-7F02-4EF3-82EC-0B3E9127208D}"/>
+                <a16:creationId xmlns="" xmlns:a16="http://schemas.microsoft.com/office/drawing/2014/main" id="{01CD7055-7F02-4EF3-82EC-0B3E9127208D}"/>
               </a:ext>
             </a:extLst>
           </p:cNvPr>
@@ -2215,7 +2215,7 @@
           <p:cNvPr id="3" name="Content Placeholder 2">
             <a:extLst>
               <a:ext uri="{FF2B5EF4-FFF2-40B4-BE49-F238E27FC236}">
-                <a16:creationId xmlns:a16="http://schemas.microsoft.com/office/drawing/2014/main" xmlns="" id="{92BFE6EC-5AC1-4C2E-BEE4-4D24B8E960F9}"/>
+                <a16:creationId xmlns="" xmlns:a16="http://schemas.microsoft.com/office/drawing/2014/main" id="{92BFE6EC-5AC1-4C2E-BEE4-4D24B8E960F9}"/>
               </a:ext>
             </a:extLst>
           </p:cNvPr>
@@ -2278,7 +2278,7 @@
           <p:cNvPr id="4" name="Content Placeholder 3">
             <a:extLst>
               <a:ext uri="{FF2B5EF4-FFF2-40B4-BE49-F238E27FC236}">
-                <a16:creationId xmlns:a16="http://schemas.microsoft.com/office/drawing/2014/main" xmlns="" id="{2710FE51-262F-46F0-80CC-FEB1647A9394}"/>
+                <a16:creationId xmlns="" xmlns:a16="http://schemas.microsoft.com/office/drawing/2014/main" id="{2710FE51-262F-46F0-80CC-FEB1647A9394}"/>
               </a:ext>
             </a:extLst>
           </p:cNvPr>
@@ -2371,7 +2371,7 @@
           <p:cNvPr id="2" name="Title 1">
             <a:extLst>
               <a:ext uri="{FF2B5EF4-FFF2-40B4-BE49-F238E27FC236}">
-                <a16:creationId xmlns:a16="http://schemas.microsoft.com/office/drawing/2014/main" xmlns="" id="{F71BC8D0-A076-4F4D-8DE7-D79DDA651F01}"/>
+                <a16:creationId xmlns="" xmlns:a16="http://schemas.microsoft.com/office/drawing/2014/main" id="{F71BC8D0-A076-4F4D-8DE7-D79DDA651F01}"/>
               </a:ext>
             </a:extLst>
           </p:cNvPr>
@@ -2405,7 +2405,7 @@
           <p:cNvPr id="3" name="Text Placeholder 2">
             <a:extLst>
               <a:ext uri="{FF2B5EF4-FFF2-40B4-BE49-F238E27FC236}">
-                <a16:creationId xmlns:a16="http://schemas.microsoft.com/office/drawing/2014/main" xmlns="" id="{BAF8532B-D279-4DD4-B484-8219644118A8}"/>
+                <a16:creationId xmlns="" xmlns:a16="http://schemas.microsoft.com/office/drawing/2014/main" id="{BAF8532B-D279-4DD4-B484-8219644118A8}"/>
               </a:ext>
             </a:extLst>
           </p:cNvPr>
@@ -2476,7 +2476,7 @@
           <p:cNvPr id="4" name="Content Placeholder 3">
             <a:extLst>
               <a:ext uri="{FF2B5EF4-FFF2-40B4-BE49-F238E27FC236}">
-                <a16:creationId xmlns:a16="http://schemas.microsoft.com/office/drawing/2014/main" xmlns="" id="{DD3A4C21-69C4-4207-80B5-1BE7EDE238AB}"/>
+                <a16:creationId xmlns="" xmlns:a16="http://schemas.microsoft.com/office/drawing/2014/main" id="{DD3A4C21-69C4-4207-80B5-1BE7EDE238AB}"/>
               </a:ext>
             </a:extLst>
           </p:cNvPr>
@@ -2539,7 +2539,7 @@
           <p:cNvPr id="5" name="Text Placeholder 4">
             <a:extLst>
               <a:ext uri="{FF2B5EF4-FFF2-40B4-BE49-F238E27FC236}">
-                <a16:creationId xmlns:a16="http://schemas.microsoft.com/office/drawing/2014/main" xmlns="" id="{6605F242-8C3C-4E15-A1FA-3B76D6B67A2D}"/>
+                <a16:creationId xmlns="" xmlns:a16="http://schemas.microsoft.com/office/drawing/2014/main" id="{6605F242-8C3C-4E15-A1FA-3B76D6B67A2D}"/>
               </a:ext>
             </a:extLst>
           </p:cNvPr>
@@ -2610,7 +2610,7 @@
           <p:cNvPr id="6" name="Content Placeholder 5">
             <a:extLst>
               <a:ext uri="{FF2B5EF4-FFF2-40B4-BE49-F238E27FC236}">
-                <a16:creationId xmlns:a16="http://schemas.microsoft.com/office/drawing/2014/main" xmlns="" id="{A073F289-1237-4F44-9727-AFB134F5EA5D}"/>
+                <a16:creationId xmlns="" xmlns:a16="http://schemas.microsoft.com/office/drawing/2014/main" id="{A073F289-1237-4F44-9727-AFB134F5EA5D}"/>
               </a:ext>
             </a:extLst>
           </p:cNvPr>
@@ -2673,7 +2673,7 @@
           <p:cNvPr id="7" name="Date Placeholder 6">
             <a:extLst>
               <a:ext uri="{FF2B5EF4-FFF2-40B4-BE49-F238E27FC236}">
-                <a16:creationId xmlns:a16="http://schemas.microsoft.com/office/drawing/2014/main" xmlns="" id="{FFE86BB1-13C4-4813-B8CE-D32F0B50FDA9}"/>
+                <a16:creationId xmlns="" xmlns:a16="http://schemas.microsoft.com/office/drawing/2014/main" id="{FFE86BB1-13C4-4813-B8CE-D32F0B50FDA9}"/>
               </a:ext>
             </a:extLst>
           </p:cNvPr>
@@ -2691,7 +2691,7 @@
           <a:p>
             <a:fld id="{A6050B9B-1BC8-4CA3-82DA-6F77721A2CD7}" type="datetime1">
               <a:rPr lang="en-US" smtClean="0"/>
-              <a:t>9/11/2018</a:t>
+              <a:t>9/12/2018</a:t>
             </a:fld>
             <a:endParaRPr lang="en-IN"/>
           </a:p>
@@ -2702,7 +2702,7 @@
           <p:cNvPr id="8" name="Footer Placeholder 7">
             <a:extLst>
               <a:ext uri="{FF2B5EF4-FFF2-40B4-BE49-F238E27FC236}">
-                <a16:creationId xmlns:a16="http://schemas.microsoft.com/office/drawing/2014/main" xmlns="" id="{EBF1F5FF-240A-45A7-9EEF-DC692A2A788F}"/>
+                <a16:creationId xmlns="" xmlns:a16="http://schemas.microsoft.com/office/drawing/2014/main" id="{EBF1F5FF-240A-45A7-9EEF-DC692A2A788F}"/>
               </a:ext>
             </a:extLst>
           </p:cNvPr>
@@ -2730,7 +2730,7 @@
           <p:cNvPr id="9" name="Slide Number Placeholder 8">
             <a:extLst>
               <a:ext uri="{FF2B5EF4-FFF2-40B4-BE49-F238E27FC236}">
-                <a16:creationId xmlns:a16="http://schemas.microsoft.com/office/drawing/2014/main" xmlns="" id="{18DCA60C-18B5-4E65-AE47-E0A9F13AA2EB}"/>
+                <a16:creationId xmlns="" xmlns:a16="http://schemas.microsoft.com/office/drawing/2014/main" id="{18DCA60C-18B5-4E65-AE47-E0A9F13AA2EB}"/>
               </a:ext>
             </a:extLst>
           </p:cNvPr>
@@ -2789,7 +2789,7 @@
           <p:cNvPr id="2" name="Title 1">
             <a:extLst>
               <a:ext uri="{FF2B5EF4-FFF2-40B4-BE49-F238E27FC236}">
-                <a16:creationId xmlns:a16="http://schemas.microsoft.com/office/drawing/2014/main" xmlns="" id="{DD5CA510-AEB8-4128-9EA1-2842F183F842}"/>
+                <a16:creationId xmlns="" xmlns:a16="http://schemas.microsoft.com/office/drawing/2014/main" id="{DD5CA510-AEB8-4128-9EA1-2842F183F842}"/>
               </a:ext>
             </a:extLst>
           </p:cNvPr>
@@ -2818,7 +2818,7 @@
           <p:cNvPr id="3" name="Date Placeholder 2">
             <a:extLst>
               <a:ext uri="{FF2B5EF4-FFF2-40B4-BE49-F238E27FC236}">
-                <a16:creationId xmlns:a16="http://schemas.microsoft.com/office/drawing/2014/main" xmlns="" id="{977611F6-736E-4C77-AEBB-EC129B6996C2}"/>
+                <a16:creationId xmlns="" xmlns:a16="http://schemas.microsoft.com/office/drawing/2014/main" id="{977611F6-736E-4C77-AEBB-EC129B6996C2}"/>
               </a:ext>
             </a:extLst>
           </p:cNvPr>
@@ -2836,7 +2836,7 @@
           <a:p>
             <a:fld id="{7BB3DCEF-6C7C-4D94-B98B-4760A5E4E479}" type="datetime1">
               <a:rPr lang="en-US" smtClean="0"/>
-              <a:t>9/11/2018</a:t>
+              <a:t>9/12/2018</a:t>
             </a:fld>
             <a:endParaRPr lang="en-IN"/>
           </a:p>
@@ -2847,7 +2847,7 @@
           <p:cNvPr id="4" name="Footer Placeholder 3">
             <a:extLst>
               <a:ext uri="{FF2B5EF4-FFF2-40B4-BE49-F238E27FC236}">
-                <a16:creationId xmlns:a16="http://schemas.microsoft.com/office/drawing/2014/main" xmlns="" id="{62933F78-2CEA-4DCE-AAA6-CF20AA95C26C}"/>
+                <a16:creationId xmlns="" xmlns:a16="http://schemas.microsoft.com/office/drawing/2014/main" id="{62933F78-2CEA-4DCE-AAA6-CF20AA95C26C}"/>
               </a:ext>
             </a:extLst>
           </p:cNvPr>
@@ -2875,7 +2875,7 @@
           <p:cNvPr id="5" name="Slide Number Placeholder 4">
             <a:extLst>
               <a:ext uri="{FF2B5EF4-FFF2-40B4-BE49-F238E27FC236}">
-                <a16:creationId xmlns:a16="http://schemas.microsoft.com/office/drawing/2014/main" xmlns="" id="{FDCB1C38-B552-4594-A0C6-19E123633E87}"/>
+                <a16:creationId xmlns="" xmlns:a16="http://schemas.microsoft.com/office/drawing/2014/main" id="{FDCB1C38-B552-4594-A0C6-19E123633E87}"/>
               </a:ext>
             </a:extLst>
           </p:cNvPr>
@@ -2934,7 +2934,7 @@
           <p:cNvPr id="2" name="Date Placeholder 1">
             <a:extLst>
               <a:ext uri="{FF2B5EF4-FFF2-40B4-BE49-F238E27FC236}">
-                <a16:creationId xmlns:a16="http://schemas.microsoft.com/office/drawing/2014/main" xmlns="" id="{CED5A8BD-EB5C-4AE7-AC1C-C92F49D2A5A9}"/>
+                <a16:creationId xmlns="" xmlns:a16="http://schemas.microsoft.com/office/drawing/2014/main" id="{CED5A8BD-EB5C-4AE7-AC1C-C92F49D2A5A9}"/>
               </a:ext>
             </a:extLst>
           </p:cNvPr>
@@ -2952,7 +2952,7 @@
           <a:p>
             <a:fld id="{27EA8829-E4BB-4FB8-829A-9DEDDC97D24F}" type="datetime1">
               <a:rPr lang="en-US" smtClean="0"/>
-              <a:t>9/11/2018</a:t>
+              <a:t>9/12/2018</a:t>
             </a:fld>
             <a:endParaRPr lang="en-IN"/>
           </a:p>
@@ -2963,7 +2963,7 @@
           <p:cNvPr id="3" name="Footer Placeholder 2">
             <a:extLst>
               <a:ext uri="{FF2B5EF4-FFF2-40B4-BE49-F238E27FC236}">
-                <a16:creationId xmlns:a16="http://schemas.microsoft.com/office/drawing/2014/main" xmlns="" id="{5DA128EA-B032-4074-BC07-E3D01FBA308D}"/>
+                <a16:creationId xmlns="" xmlns:a16="http://schemas.microsoft.com/office/drawing/2014/main" id="{5DA128EA-B032-4074-BC07-E3D01FBA308D}"/>
               </a:ext>
             </a:extLst>
           </p:cNvPr>
@@ -2991,7 +2991,7 @@
           <p:cNvPr id="4" name="Slide Number Placeholder 3">
             <a:extLst>
               <a:ext uri="{FF2B5EF4-FFF2-40B4-BE49-F238E27FC236}">
-                <a16:creationId xmlns:a16="http://schemas.microsoft.com/office/drawing/2014/main" xmlns="" id="{E657A638-4080-4865-AD33-09DE6E90D001}"/>
+                <a16:creationId xmlns="" xmlns:a16="http://schemas.microsoft.com/office/drawing/2014/main" id="{E657A638-4080-4865-AD33-09DE6E90D001}"/>
               </a:ext>
             </a:extLst>
           </p:cNvPr>
@@ -3050,7 +3050,7 @@
           <p:cNvPr id="2" name="Title 1">
             <a:extLst>
               <a:ext uri="{FF2B5EF4-FFF2-40B4-BE49-F238E27FC236}">
-                <a16:creationId xmlns:a16="http://schemas.microsoft.com/office/drawing/2014/main" xmlns="" id="{6798B78C-4287-4A9D-9364-3F918CA72C81}"/>
+                <a16:creationId xmlns="" xmlns:a16="http://schemas.microsoft.com/office/drawing/2014/main" id="{6798B78C-4287-4A9D-9364-3F918CA72C81}"/>
               </a:ext>
             </a:extLst>
           </p:cNvPr>
@@ -3088,7 +3088,7 @@
           <p:cNvPr id="3" name="Content Placeholder 2">
             <a:extLst>
               <a:ext uri="{FF2B5EF4-FFF2-40B4-BE49-F238E27FC236}">
-                <a16:creationId xmlns:a16="http://schemas.microsoft.com/office/drawing/2014/main" xmlns="" id="{C3550577-4DBB-4D22-9D7F-A701C3DF3A25}"/>
+                <a16:creationId xmlns="" xmlns:a16="http://schemas.microsoft.com/office/drawing/2014/main" id="{C3550577-4DBB-4D22-9D7F-A701C3DF3A25}"/>
               </a:ext>
             </a:extLst>
           </p:cNvPr>
@@ -3179,7 +3179,7 @@
           <p:cNvPr id="4" name="Text Placeholder 3">
             <a:extLst>
               <a:ext uri="{FF2B5EF4-FFF2-40B4-BE49-F238E27FC236}">
-                <a16:creationId xmlns:a16="http://schemas.microsoft.com/office/drawing/2014/main" xmlns="" id="{E7522999-BACF-4582-AB3E-59D3E4A867A9}"/>
+                <a16:creationId xmlns="" xmlns:a16="http://schemas.microsoft.com/office/drawing/2014/main" id="{E7522999-BACF-4582-AB3E-59D3E4A867A9}"/>
               </a:ext>
             </a:extLst>
           </p:cNvPr>
@@ -3250,7 +3250,7 @@
           <p:cNvPr id="5" name="Date Placeholder 4">
             <a:extLst>
               <a:ext uri="{FF2B5EF4-FFF2-40B4-BE49-F238E27FC236}">
-                <a16:creationId xmlns:a16="http://schemas.microsoft.com/office/drawing/2014/main" xmlns="" id="{AAE5E98F-521F-426F-92EB-49F91CAF1A2D}"/>
+                <a16:creationId xmlns="" xmlns:a16="http://schemas.microsoft.com/office/drawing/2014/main" id="{AAE5E98F-521F-426F-92EB-49F91CAF1A2D}"/>
               </a:ext>
             </a:extLst>
           </p:cNvPr>
@@ -3268,7 +3268,7 @@
           <a:p>
             <a:fld id="{339E292C-70A2-466B-A6AA-073D34F79EBD}" type="datetime1">
               <a:rPr lang="en-US" smtClean="0"/>
-              <a:t>9/11/2018</a:t>
+              <a:t>9/12/2018</a:t>
             </a:fld>
             <a:endParaRPr lang="en-IN"/>
           </a:p>
@@ -3279,7 +3279,7 @@
           <p:cNvPr id="6" name="Footer Placeholder 5">
             <a:extLst>
               <a:ext uri="{FF2B5EF4-FFF2-40B4-BE49-F238E27FC236}">
-                <a16:creationId xmlns:a16="http://schemas.microsoft.com/office/drawing/2014/main" xmlns="" id="{94F9DCA8-05E0-4CEC-9003-CC7329DB777E}"/>
+                <a16:creationId xmlns="" xmlns:a16="http://schemas.microsoft.com/office/drawing/2014/main" id="{94F9DCA8-05E0-4CEC-9003-CC7329DB777E}"/>
               </a:ext>
             </a:extLst>
           </p:cNvPr>
@@ -3307,7 +3307,7 @@
           <p:cNvPr id="7" name="Slide Number Placeholder 6">
             <a:extLst>
               <a:ext uri="{FF2B5EF4-FFF2-40B4-BE49-F238E27FC236}">
-                <a16:creationId xmlns:a16="http://schemas.microsoft.com/office/drawing/2014/main" xmlns="" id="{B52D49E5-39E9-450E-9BAC-1902FFA40648}"/>
+                <a16:creationId xmlns="" xmlns:a16="http://schemas.microsoft.com/office/drawing/2014/main" id="{B52D49E5-39E9-450E-9BAC-1902FFA40648}"/>
               </a:ext>
             </a:extLst>
           </p:cNvPr>
@@ -3366,7 +3366,7 @@
           <p:cNvPr id="2" name="Title 1">
             <a:extLst>
               <a:ext uri="{FF2B5EF4-FFF2-40B4-BE49-F238E27FC236}">
-                <a16:creationId xmlns:a16="http://schemas.microsoft.com/office/drawing/2014/main" xmlns="" id="{E38A7FCC-384F-420A-993E-54D258385FB4}"/>
+                <a16:creationId xmlns="" xmlns:a16="http://schemas.microsoft.com/office/drawing/2014/main" id="{E38A7FCC-384F-420A-993E-54D258385FB4}"/>
               </a:ext>
             </a:extLst>
           </p:cNvPr>
@@ -3404,7 +3404,7 @@
           <p:cNvPr id="3" name="Picture Placeholder 2">
             <a:extLst>
               <a:ext uri="{FF2B5EF4-FFF2-40B4-BE49-F238E27FC236}">
-                <a16:creationId xmlns:a16="http://schemas.microsoft.com/office/drawing/2014/main" xmlns="" id="{7E4ECFE1-69BD-4341-A317-3791147537D1}"/>
+                <a16:creationId xmlns="" xmlns:a16="http://schemas.microsoft.com/office/drawing/2014/main" id="{7E4ECFE1-69BD-4341-A317-3791147537D1}"/>
               </a:ext>
             </a:extLst>
           </p:cNvPr>
@@ -3471,7 +3471,7 @@
           <p:cNvPr id="4" name="Text Placeholder 3">
             <a:extLst>
               <a:ext uri="{FF2B5EF4-FFF2-40B4-BE49-F238E27FC236}">
-                <a16:creationId xmlns:a16="http://schemas.microsoft.com/office/drawing/2014/main" xmlns="" id="{B82AD758-7601-4A87-AF7B-600FDD6D17D6}"/>
+                <a16:creationId xmlns="" xmlns:a16="http://schemas.microsoft.com/office/drawing/2014/main" id="{B82AD758-7601-4A87-AF7B-600FDD6D17D6}"/>
               </a:ext>
             </a:extLst>
           </p:cNvPr>
@@ -3542,7 +3542,7 @@
           <p:cNvPr id="5" name="Date Placeholder 4">
             <a:extLst>
               <a:ext uri="{FF2B5EF4-FFF2-40B4-BE49-F238E27FC236}">
-                <a16:creationId xmlns:a16="http://schemas.microsoft.com/office/drawing/2014/main" xmlns="" id="{ADA6082D-8C4A-4BB7-9AFE-16DADD6B7B6F}"/>
+                <a16:creationId xmlns="" xmlns:a16="http://schemas.microsoft.com/office/drawing/2014/main" id="{ADA6082D-8C4A-4BB7-9AFE-16DADD6B7B6F}"/>
               </a:ext>
             </a:extLst>
           </p:cNvPr>
@@ -3560,7 +3560,7 @@
           <a:p>
             <a:fld id="{7F96983B-C021-4463-AEEB-0487B7DE15FC}" type="datetime1">
               <a:rPr lang="en-US" smtClean="0"/>
-              <a:t>9/11/2018</a:t>
+              <a:t>9/12/2018</a:t>
             </a:fld>
             <a:endParaRPr lang="en-IN"/>
           </a:p>
@@ -3571,7 +3571,7 @@
           <p:cNvPr id="6" name="Footer Placeholder 5">
             <a:extLst>
               <a:ext uri="{FF2B5EF4-FFF2-40B4-BE49-F238E27FC236}">
-                <a16:creationId xmlns:a16="http://schemas.microsoft.com/office/drawing/2014/main" xmlns="" id="{15FF11C7-F99A-447F-9D49-B09DCF645860}"/>
+                <a16:creationId xmlns="" xmlns:a16="http://schemas.microsoft.com/office/drawing/2014/main" id="{15FF11C7-F99A-447F-9D49-B09DCF645860}"/>
               </a:ext>
             </a:extLst>
           </p:cNvPr>
@@ -3599,7 +3599,7 @@
           <p:cNvPr id="7" name="Slide Number Placeholder 6">
             <a:extLst>
               <a:ext uri="{FF2B5EF4-FFF2-40B4-BE49-F238E27FC236}">
-                <a16:creationId xmlns:a16="http://schemas.microsoft.com/office/drawing/2014/main" xmlns="" id="{03DA21CD-1E89-4E9D-8076-56FF6054F325}"/>
+                <a16:creationId xmlns="" xmlns:a16="http://schemas.microsoft.com/office/drawing/2014/main" id="{03DA21CD-1E89-4E9D-8076-56FF6054F325}"/>
               </a:ext>
             </a:extLst>
           </p:cNvPr>
@@ -3663,7 +3663,7 @@
           <p:cNvPr id="2" name="Title Placeholder 1">
             <a:extLst>
               <a:ext uri="{FF2B5EF4-FFF2-40B4-BE49-F238E27FC236}">
-                <a16:creationId xmlns:a16="http://schemas.microsoft.com/office/drawing/2014/main" xmlns="" id="{A0A622CE-8CA6-494D-94A6-BC43BC13C31D}"/>
+                <a16:creationId xmlns="" xmlns:a16="http://schemas.microsoft.com/office/drawing/2014/main" id="{A0A622CE-8CA6-494D-94A6-BC43BC13C31D}"/>
               </a:ext>
             </a:extLst>
           </p:cNvPr>
@@ -3702,7 +3702,7 @@
           <p:cNvPr id="3" name="Text Placeholder 2">
             <a:extLst>
               <a:ext uri="{FF2B5EF4-FFF2-40B4-BE49-F238E27FC236}">
-                <a16:creationId xmlns:a16="http://schemas.microsoft.com/office/drawing/2014/main" xmlns="" id="{2897D63F-B318-4D28-9EAD-6A1B1FD36976}"/>
+                <a16:creationId xmlns="" xmlns:a16="http://schemas.microsoft.com/office/drawing/2014/main" id="{2897D63F-B318-4D28-9EAD-6A1B1FD36976}"/>
               </a:ext>
             </a:extLst>
           </p:cNvPr>
@@ -3770,7 +3770,7 @@
           <p:cNvPr id="4" name="Date Placeholder 3">
             <a:extLst>
               <a:ext uri="{FF2B5EF4-FFF2-40B4-BE49-F238E27FC236}">
-                <a16:creationId xmlns:a16="http://schemas.microsoft.com/office/drawing/2014/main" xmlns="" id="{184D99BC-6479-4914-AF03-F0ED15CDB36B}"/>
+                <a16:creationId xmlns="" xmlns:a16="http://schemas.microsoft.com/office/drawing/2014/main" id="{184D99BC-6479-4914-AF03-F0ED15CDB36B}"/>
               </a:ext>
             </a:extLst>
           </p:cNvPr>
@@ -3806,7 +3806,7 @@
           <a:p>
             <a:fld id="{4AC68366-01C1-4B35-AF5D-CCC67BA95106}" type="datetime1">
               <a:rPr lang="en-US" smtClean="0"/>
-              <a:t>9/11/2018</a:t>
+              <a:t>9/12/2018</a:t>
             </a:fld>
             <a:endParaRPr lang="en-IN"/>
           </a:p>
@@ -3817,7 +3817,7 @@
           <p:cNvPr id="5" name="Footer Placeholder 4">
             <a:extLst>
               <a:ext uri="{FF2B5EF4-FFF2-40B4-BE49-F238E27FC236}">
-                <a16:creationId xmlns:a16="http://schemas.microsoft.com/office/drawing/2014/main" xmlns="" id="{4345C3BD-3D0D-4E8D-AC47-299937A47A58}"/>
+                <a16:creationId xmlns="" xmlns:a16="http://schemas.microsoft.com/office/drawing/2014/main" id="{4345C3BD-3D0D-4E8D-AC47-299937A47A58}"/>
               </a:ext>
             </a:extLst>
           </p:cNvPr>
@@ -3863,7 +3863,7 @@
           <p:cNvPr id="6" name="Slide Number Placeholder 5">
             <a:extLst>
               <a:ext uri="{FF2B5EF4-FFF2-40B4-BE49-F238E27FC236}">
-                <a16:creationId xmlns:a16="http://schemas.microsoft.com/office/drawing/2014/main" xmlns="" id="{6E801136-EAB4-444B-A0E7-33399A7BEB31}"/>
+                <a16:creationId xmlns="" xmlns:a16="http://schemas.microsoft.com/office/drawing/2014/main" id="{6E801136-EAB4-444B-A0E7-33399A7BEB31}"/>
               </a:ext>
             </a:extLst>
           </p:cNvPr>
@@ -4233,7 +4233,7 @@
           <p:cNvPr id="5" name="Rectangle 4">
             <a:extLst>
               <a:ext uri="{FF2B5EF4-FFF2-40B4-BE49-F238E27FC236}">
-                <a16:creationId xmlns:a16="http://schemas.microsoft.com/office/drawing/2014/main" xmlns="" id="{C51C950A-E31E-416F-8640-D2B78EAD4B9B}"/>
+                <a16:creationId xmlns="" xmlns:a16="http://schemas.microsoft.com/office/drawing/2014/main" id="{C51C950A-E31E-416F-8640-D2B78EAD4B9B}"/>
               </a:ext>
             </a:extLst>
           </p:cNvPr>
@@ -4280,7 +4280,7 @@
           <p:cNvPr id="6" name="Rectangle 5">
             <a:extLst>
               <a:ext uri="{FF2B5EF4-FFF2-40B4-BE49-F238E27FC236}">
-                <a16:creationId xmlns:a16="http://schemas.microsoft.com/office/drawing/2014/main" xmlns="" id="{24E7FFBD-1F79-4309-9FA2-375DF46F9F10}"/>
+                <a16:creationId xmlns="" xmlns:a16="http://schemas.microsoft.com/office/drawing/2014/main" id="{24E7FFBD-1F79-4309-9FA2-375DF46F9F10}"/>
               </a:ext>
             </a:extLst>
           </p:cNvPr>
@@ -4319,7 +4319,7 @@
           <p:cNvPr id="13" name="Date Placeholder 2">
             <a:extLst>
               <a:ext uri="{FF2B5EF4-FFF2-40B4-BE49-F238E27FC236}">
-                <a16:creationId xmlns:a16="http://schemas.microsoft.com/office/drawing/2014/main" xmlns="" id="{CF0E13E0-3A7C-4B34-8560-EB7544F93A86}"/>
+                <a16:creationId xmlns="" xmlns:a16="http://schemas.microsoft.com/office/drawing/2014/main" id="{CF0E13E0-3A7C-4B34-8560-EB7544F93A86}"/>
               </a:ext>
             </a:extLst>
           </p:cNvPr>
@@ -4456,7 +4456,7 @@
           <p:cNvPr id="14" name="Date Placeholder 2">
             <a:extLst>
               <a:ext uri="{FF2B5EF4-FFF2-40B4-BE49-F238E27FC236}">
-                <a16:creationId xmlns:a16="http://schemas.microsoft.com/office/drawing/2014/main" xmlns="" id="{FEFC45B0-A45F-4AD1-9B02-07D26B99CABB}"/>
+                <a16:creationId xmlns="" xmlns:a16="http://schemas.microsoft.com/office/drawing/2014/main" id="{FEFC45B0-A45F-4AD1-9B02-07D26B99CABB}"/>
               </a:ext>
             </a:extLst>
           </p:cNvPr>
@@ -4630,7 +4630,7 @@
           <p:cNvPr id="6" name="Date Placeholder 2">
             <a:extLst>
               <a:ext uri="{FF2B5EF4-FFF2-40B4-BE49-F238E27FC236}">
-                <a16:creationId xmlns:a16="http://schemas.microsoft.com/office/drawing/2014/main" xmlns="" id="{180FC470-B565-4FB6-B0D5-7C8F5744990B}"/>
+                <a16:creationId xmlns="" xmlns:a16="http://schemas.microsoft.com/office/drawing/2014/main" id="{180FC470-B565-4FB6-B0D5-7C8F5744990B}"/>
               </a:ext>
             </a:extLst>
           </p:cNvPr>
@@ -4675,11 +4675,7 @@
             </a:r>
             <a:r>
               <a:rPr lang="en-IN" dirty="0" smtClean="0"/>
-              <a:t> Dang</a:t>
-            </a:r>
-            <a:r>
-              <a:rPr lang="en-IN" dirty="0" smtClean="0"/>
-              <a:t>, </a:t>
+              <a:t> Dang, </a:t>
             </a:r>
             <a:r>
               <a:rPr lang="en-IN" dirty="0" err="1" smtClean="0"/>
@@ -4727,7 +4723,7 @@
           <p:cNvPr id="7" name="Footer Placeholder 3">
             <a:extLst>
               <a:ext uri="{FF2B5EF4-FFF2-40B4-BE49-F238E27FC236}">
-                <a16:creationId xmlns:a16="http://schemas.microsoft.com/office/drawing/2014/main" xmlns="" id="{AA1A078D-2DA1-41AC-A894-48E19FF3FAE3}"/>
+                <a16:creationId xmlns="" xmlns:a16="http://schemas.microsoft.com/office/drawing/2014/main" id="{AA1A078D-2DA1-41AC-A894-48E19FF3FAE3}"/>
               </a:ext>
             </a:extLst>
           </p:cNvPr>
@@ -4794,7 +4790,7 @@
           <p:cNvPr id="9" name="Date Placeholder 2">
             <a:extLst>
               <a:ext uri="{FF2B5EF4-FFF2-40B4-BE49-F238E27FC236}">
-                <a16:creationId xmlns:a16="http://schemas.microsoft.com/office/drawing/2014/main" xmlns="" id="{254BB5F0-2280-4072-A92F-9321101FB009}"/>
+                <a16:creationId xmlns="" xmlns:a16="http://schemas.microsoft.com/office/drawing/2014/main" id="{254BB5F0-2280-4072-A92F-9321101FB009}"/>
               </a:ext>
             </a:extLst>
           </p:cNvPr>
@@ -4930,7 +4926,7 @@
           <p:cNvPr id="10" name="Straight Connector 9">
             <a:extLst>
               <a:ext uri="{FF2B5EF4-FFF2-40B4-BE49-F238E27FC236}">
-                <a16:creationId xmlns:a16="http://schemas.microsoft.com/office/drawing/2014/main" xmlns="" id="{0B6697B4-1AD9-4089-92FD-6CFE29B6E807}"/>
+                <a16:creationId xmlns="" xmlns:a16="http://schemas.microsoft.com/office/drawing/2014/main" id="{0B6697B4-1AD9-4089-92FD-6CFE29B6E807}"/>
               </a:ext>
             </a:extLst>
           </p:cNvPr>
@@ -5165,7 +5161,7 @@
           <p:cNvPr id="2" name="Date Placeholder 2">
             <a:extLst>
               <a:ext uri="{FF2B5EF4-FFF2-40B4-BE49-F238E27FC236}">
-                <a16:creationId xmlns:a16="http://schemas.microsoft.com/office/drawing/2014/main" xmlns="" id="{180FC470-B565-4FB6-B0D5-7C8F5744990B}"/>
+                <a16:creationId xmlns="" xmlns:a16="http://schemas.microsoft.com/office/drawing/2014/main" id="{180FC470-B565-4FB6-B0D5-7C8F5744990B}"/>
               </a:ext>
             </a:extLst>
           </p:cNvPr>
@@ -5210,11 +5206,7 @@
             </a:r>
             <a:r>
               <a:rPr lang="en-IN" dirty="0" smtClean="0"/>
-              <a:t> Dang</a:t>
-            </a:r>
-            <a:r>
-              <a:rPr lang="en-IN" dirty="0" smtClean="0"/>
-              <a:t>, </a:t>
+              <a:t> Dang, </a:t>
             </a:r>
             <a:r>
               <a:rPr lang="en-IN" dirty="0" err="1" smtClean="0"/>
@@ -5262,7 +5254,7 @@
           <p:cNvPr id="3" name="Footer Placeholder 3">
             <a:extLst>
               <a:ext uri="{FF2B5EF4-FFF2-40B4-BE49-F238E27FC236}">
-                <a16:creationId xmlns:a16="http://schemas.microsoft.com/office/drawing/2014/main" xmlns="" id="{AA1A078D-2DA1-41AC-A894-48E19FF3FAE3}"/>
+                <a16:creationId xmlns="" xmlns:a16="http://schemas.microsoft.com/office/drawing/2014/main" id="{AA1A078D-2DA1-41AC-A894-48E19FF3FAE3}"/>
               </a:ext>
             </a:extLst>
           </p:cNvPr>
@@ -5329,7 +5321,7 @@
           <p:cNvPr id="4" name="Date Placeholder 2">
             <a:extLst>
               <a:ext uri="{FF2B5EF4-FFF2-40B4-BE49-F238E27FC236}">
-                <a16:creationId xmlns:a16="http://schemas.microsoft.com/office/drawing/2014/main" xmlns="" id="{254BB5F0-2280-4072-A92F-9321101FB009}"/>
+                <a16:creationId xmlns="" xmlns:a16="http://schemas.microsoft.com/office/drawing/2014/main" id="{254BB5F0-2280-4072-A92F-9321101FB009}"/>
               </a:ext>
             </a:extLst>
           </p:cNvPr>
@@ -5465,7 +5457,7 @@
           <p:cNvPr id="5" name="Straight Connector 4">
             <a:extLst>
               <a:ext uri="{FF2B5EF4-FFF2-40B4-BE49-F238E27FC236}">
-                <a16:creationId xmlns:a16="http://schemas.microsoft.com/office/drawing/2014/main" xmlns="" id="{0B6697B4-1AD9-4089-92FD-6CFE29B6E807}"/>
+                <a16:creationId xmlns="" xmlns:a16="http://schemas.microsoft.com/office/drawing/2014/main" id="{0B6697B4-1AD9-4089-92FD-6CFE29B6E807}"/>
               </a:ext>
             </a:extLst>
           </p:cNvPr>
@@ -5880,7 +5872,7 @@
           <p:cNvPr id="2" name="Date Placeholder 2">
             <a:extLst>
               <a:ext uri="{FF2B5EF4-FFF2-40B4-BE49-F238E27FC236}">
-                <a16:creationId xmlns:a16="http://schemas.microsoft.com/office/drawing/2014/main" xmlns="" id="{180FC470-B565-4FB6-B0D5-7C8F5744990B}"/>
+                <a16:creationId xmlns="" xmlns:a16="http://schemas.microsoft.com/office/drawing/2014/main" id="{180FC470-B565-4FB6-B0D5-7C8F5744990B}"/>
               </a:ext>
             </a:extLst>
           </p:cNvPr>
@@ -5925,11 +5917,7 @@
             </a:r>
             <a:r>
               <a:rPr lang="en-IN" dirty="0" smtClean="0"/>
-              <a:t> Dang</a:t>
-            </a:r>
-            <a:r>
-              <a:rPr lang="en-IN" dirty="0" smtClean="0"/>
-              <a:t>, </a:t>
+              <a:t> Dang, </a:t>
             </a:r>
             <a:r>
               <a:rPr lang="en-IN" dirty="0" err="1" smtClean="0"/>
@@ -5977,7 +5965,7 @@
           <p:cNvPr id="3" name="Footer Placeholder 3">
             <a:extLst>
               <a:ext uri="{FF2B5EF4-FFF2-40B4-BE49-F238E27FC236}">
-                <a16:creationId xmlns:a16="http://schemas.microsoft.com/office/drawing/2014/main" xmlns="" id="{AA1A078D-2DA1-41AC-A894-48E19FF3FAE3}"/>
+                <a16:creationId xmlns="" xmlns:a16="http://schemas.microsoft.com/office/drawing/2014/main" id="{AA1A078D-2DA1-41AC-A894-48E19FF3FAE3}"/>
               </a:ext>
             </a:extLst>
           </p:cNvPr>
@@ -6044,7 +6032,7 @@
           <p:cNvPr id="4" name="Date Placeholder 2">
             <a:extLst>
               <a:ext uri="{FF2B5EF4-FFF2-40B4-BE49-F238E27FC236}">
-                <a16:creationId xmlns:a16="http://schemas.microsoft.com/office/drawing/2014/main" xmlns="" id="{254BB5F0-2280-4072-A92F-9321101FB009}"/>
+                <a16:creationId xmlns="" xmlns:a16="http://schemas.microsoft.com/office/drawing/2014/main" id="{254BB5F0-2280-4072-A92F-9321101FB009}"/>
               </a:ext>
             </a:extLst>
           </p:cNvPr>
@@ -6180,7 +6168,7 @@
           <p:cNvPr id="5" name="Straight Connector 4">
             <a:extLst>
               <a:ext uri="{FF2B5EF4-FFF2-40B4-BE49-F238E27FC236}">
-                <a16:creationId xmlns:a16="http://schemas.microsoft.com/office/drawing/2014/main" xmlns="" id="{0B6697B4-1AD9-4089-92FD-6CFE29B6E807}"/>
+                <a16:creationId xmlns="" xmlns:a16="http://schemas.microsoft.com/office/drawing/2014/main" id="{0B6697B4-1AD9-4089-92FD-6CFE29B6E807}"/>
               </a:ext>
             </a:extLst>
           </p:cNvPr>
@@ -6411,6 +6399,36 @@
           </a:p>
         </p:txBody>
       </p:sp>
+      <p:pic>
+        <p:nvPicPr>
+          <p:cNvPr id="7" name="Picture 6"/>
+          <p:cNvPicPr>
+            <a:picLocks noChangeAspect="1"/>
+          </p:cNvPicPr>
+          <p:nvPr/>
+        </p:nvPicPr>
+        <p:blipFill>
+          <a:blip r:embed="rId2">
+            <a:extLst>
+              <a:ext uri="{28A0092B-C50C-407E-A947-70E740481C1C}">
+                <a14:useLocalDpi xmlns:a14="http://schemas.microsoft.com/office/drawing/2010/main" val="0"/>
+              </a:ext>
+            </a:extLst>
+          </a:blip>
+          <a:stretch>
+            <a:fillRect/>
+          </a:stretch>
+        </p:blipFill>
+        <p:spPr>
+          <a:xfrm>
+            <a:off x="4224727" y="1310318"/>
+            <a:ext cx="4030631" cy="4742224"/>
+          </a:xfrm>
+          <a:prstGeom prst="rect">
+            <a:avLst/>
+          </a:prstGeom>
+        </p:spPr>
+      </p:pic>
     </p:spTree>
     <p:extLst>
       <p:ext uri="{BB962C8B-B14F-4D97-AF65-F5344CB8AC3E}">
@@ -6453,7 +6471,7 @@
           <p:cNvPr id="2" name="Date Placeholder 2">
             <a:extLst>
               <a:ext uri="{FF2B5EF4-FFF2-40B4-BE49-F238E27FC236}">
-                <a16:creationId xmlns:a16="http://schemas.microsoft.com/office/drawing/2014/main" xmlns="" id="{180FC470-B565-4FB6-B0D5-7C8F5744990B}"/>
+                <a16:creationId xmlns="" xmlns:a16="http://schemas.microsoft.com/office/drawing/2014/main" id="{180FC470-B565-4FB6-B0D5-7C8F5744990B}"/>
               </a:ext>
             </a:extLst>
           </p:cNvPr>
@@ -6498,11 +6516,7 @@
             </a:r>
             <a:r>
               <a:rPr lang="en-IN" dirty="0" smtClean="0"/>
-              <a:t> Dang</a:t>
-            </a:r>
-            <a:r>
-              <a:rPr lang="en-IN" dirty="0" smtClean="0"/>
-              <a:t>, </a:t>
+              <a:t> Dang, </a:t>
             </a:r>
             <a:r>
               <a:rPr lang="en-IN" dirty="0" err="1" smtClean="0"/>
@@ -6550,7 +6564,7 @@
           <p:cNvPr id="3" name="Footer Placeholder 3">
             <a:extLst>
               <a:ext uri="{FF2B5EF4-FFF2-40B4-BE49-F238E27FC236}">
-                <a16:creationId xmlns:a16="http://schemas.microsoft.com/office/drawing/2014/main" xmlns="" id="{AA1A078D-2DA1-41AC-A894-48E19FF3FAE3}"/>
+                <a16:creationId xmlns="" xmlns:a16="http://schemas.microsoft.com/office/drawing/2014/main" id="{AA1A078D-2DA1-41AC-A894-48E19FF3FAE3}"/>
               </a:ext>
             </a:extLst>
           </p:cNvPr>
@@ -6617,7 +6631,7 @@
           <p:cNvPr id="4" name="Date Placeholder 2">
             <a:extLst>
               <a:ext uri="{FF2B5EF4-FFF2-40B4-BE49-F238E27FC236}">
-                <a16:creationId xmlns:a16="http://schemas.microsoft.com/office/drawing/2014/main" xmlns="" id="{254BB5F0-2280-4072-A92F-9321101FB009}"/>
+                <a16:creationId xmlns="" xmlns:a16="http://schemas.microsoft.com/office/drawing/2014/main" id="{254BB5F0-2280-4072-A92F-9321101FB009}"/>
               </a:ext>
             </a:extLst>
           </p:cNvPr>
@@ -6753,7 +6767,7 @@
           <p:cNvPr id="5" name="Straight Connector 4">
             <a:extLst>
               <a:ext uri="{FF2B5EF4-FFF2-40B4-BE49-F238E27FC236}">
-                <a16:creationId xmlns:a16="http://schemas.microsoft.com/office/drawing/2014/main" xmlns="" id="{0B6697B4-1AD9-4089-92FD-6CFE29B6E807}"/>
+                <a16:creationId xmlns="" xmlns:a16="http://schemas.microsoft.com/office/drawing/2014/main" id="{0B6697B4-1AD9-4089-92FD-6CFE29B6E807}"/>
               </a:ext>
             </a:extLst>
           </p:cNvPr>
@@ -7272,7 +7286,7 @@
           <p:cNvPr id="2" name="Date Placeholder 2">
             <a:extLst>
               <a:ext uri="{FF2B5EF4-FFF2-40B4-BE49-F238E27FC236}">
-                <a16:creationId xmlns:a16="http://schemas.microsoft.com/office/drawing/2014/main" xmlns="" id="{180FC470-B565-4FB6-B0D5-7C8F5744990B}"/>
+                <a16:creationId xmlns="" xmlns:a16="http://schemas.microsoft.com/office/drawing/2014/main" id="{180FC470-B565-4FB6-B0D5-7C8F5744990B}"/>
               </a:ext>
             </a:extLst>
           </p:cNvPr>
@@ -7317,11 +7331,7 @@
             </a:r>
             <a:r>
               <a:rPr lang="en-IN" dirty="0" smtClean="0"/>
-              <a:t> Dang</a:t>
-            </a:r>
-            <a:r>
-              <a:rPr lang="en-IN" dirty="0" smtClean="0"/>
-              <a:t>, </a:t>
+              <a:t> Dang, </a:t>
             </a:r>
             <a:r>
               <a:rPr lang="en-IN" dirty="0" err="1" smtClean="0"/>
@@ -7369,7 +7379,7 @@
           <p:cNvPr id="3" name="Footer Placeholder 3">
             <a:extLst>
               <a:ext uri="{FF2B5EF4-FFF2-40B4-BE49-F238E27FC236}">
-                <a16:creationId xmlns:a16="http://schemas.microsoft.com/office/drawing/2014/main" xmlns="" id="{AA1A078D-2DA1-41AC-A894-48E19FF3FAE3}"/>
+                <a16:creationId xmlns="" xmlns:a16="http://schemas.microsoft.com/office/drawing/2014/main" id="{AA1A078D-2DA1-41AC-A894-48E19FF3FAE3}"/>
               </a:ext>
             </a:extLst>
           </p:cNvPr>
@@ -7436,7 +7446,7 @@
           <p:cNvPr id="4" name="Date Placeholder 2">
             <a:extLst>
               <a:ext uri="{FF2B5EF4-FFF2-40B4-BE49-F238E27FC236}">
-                <a16:creationId xmlns:a16="http://schemas.microsoft.com/office/drawing/2014/main" xmlns="" id="{254BB5F0-2280-4072-A92F-9321101FB009}"/>
+                <a16:creationId xmlns="" xmlns:a16="http://schemas.microsoft.com/office/drawing/2014/main" id="{254BB5F0-2280-4072-A92F-9321101FB009}"/>
               </a:ext>
             </a:extLst>
           </p:cNvPr>
@@ -7572,7 +7582,7 @@
           <p:cNvPr id="5" name="Straight Connector 4">
             <a:extLst>
               <a:ext uri="{FF2B5EF4-FFF2-40B4-BE49-F238E27FC236}">
-                <a16:creationId xmlns:a16="http://schemas.microsoft.com/office/drawing/2014/main" xmlns="" id="{0B6697B4-1AD9-4089-92FD-6CFE29B6E807}"/>
+                <a16:creationId xmlns="" xmlns:a16="http://schemas.microsoft.com/office/drawing/2014/main" id="{0B6697B4-1AD9-4089-92FD-6CFE29B6E807}"/>
               </a:ext>
             </a:extLst>
           </p:cNvPr>
@@ -7799,7 +7809,6 @@
               <a:rPr lang="de-DE" sz="3600" dirty="0"/>
               <a:t>Evolution des Systems</a:t>
             </a:r>
-            <a:endParaRPr lang="de-DE" sz="3600" dirty="0"/>
           </a:p>
         </p:txBody>
       </p:sp>
@@ -7929,7 +7938,15 @@
           <a:p>
             <a:r>
               <a:rPr lang="de-DE" dirty="0" smtClean="0"/>
-              <a:t>Hier zeigt Ergebniss von 2 Lichten:</a:t>
+              <a:t>Hier zeigt </a:t>
+            </a:r>
+            <a:r>
+              <a:rPr lang="de-DE" dirty="0" smtClean="0"/>
+              <a:t>Ergebnis </a:t>
+            </a:r>
+            <a:r>
+              <a:rPr lang="de-DE" dirty="0" smtClean="0"/>
+              <a:t>von 2 Lichten:</a:t>
             </a:r>
           </a:p>
           <a:p>
@@ -7983,7 +8000,7 @@
           <p:cNvPr id="2" name="Date Placeholder 2">
             <a:extLst>
               <a:ext uri="{FF2B5EF4-FFF2-40B4-BE49-F238E27FC236}">
-                <a16:creationId xmlns:a16="http://schemas.microsoft.com/office/drawing/2014/main" xmlns="" id="{180FC470-B565-4FB6-B0D5-7C8F5744990B}"/>
+                <a16:creationId xmlns="" xmlns:a16="http://schemas.microsoft.com/office/drawing/2014/main" id="{180FC470-B565-4FB6-B0D5-7C8F5744990B}"/>
               </a:ext>
             </a:extLst>
           </p:cNvPr>
@@ -8028,11 +8045,7 @@
             </a:r>
             <a:r>
               <a:rPr lang="en-IN" dirty="0" smtClean="0"/>
-              <a:t> Dang</a:t>
-            </a:r>
-            <a:r>
-              <a:rPr lang="en-IN" dirty="0" smtClean="0"/>
-              <a:t>, </a:t>
+              <a:t> Dang, </a:t>
             </a:r>
             <a:r>
               <a:rPr lang="en-IN" dirty="0" err="1" smtClean="0"/>
@@ -8080,7 +8093,7 @@
           <p:cNvPr id="3" name="Footer Placeholder 3">
             <a:extLst>
               <a:ext uri="{FF2B5EF4-FFF2-40B4-BE49-F238E27FC236}">
-                <a16:creationId xmlns:a16="http://schemas.microsoft.com/office/drawing/2014/main" xmlns="" id="{AA1A078D-2DA1-41AC-A894-48E19FF3FAE3}"/>
+                <a16:creationId xmlns="" xmlns:a16="http://schemas.microsoft.com/office/drawing/2014/main" id="{AA1A078D-2DA1-41AC-A894-48E19FF3FAE3}"/>
               </a:ext>
             </a:extLst>
           </p:cNvPr>
@@ -8147,7 +8160,7 @@
           <p:cNvPr id="4" name="Date Placeholder 2">
             <a:extLst>
               <a:ext uri="{FF2B5EF4-FFF2-40B4-BE49-F238E27FC236}">
-                <a16:creationId xmlns:a16="http://schemas.microsoft.com/office/drawing/2014/main" xmlns="" id="{254BB5F0-2280-4072-A92F-9321101FB009}"/>
+                <a16:creationId xmlns="" xmlns:a16="http://schemas.microsoft.com/office/drawing/2014/main" id="{254BB5F0-2280-4072-A92F-9321101FB009}"/>
               </a:ext>
             </a:extLst>
           </p:cNvPr>
@@ -8283,7 +8296,7 @@
           <p:cNvPr id="5" name="Straight Connector 4">
             <a:extLst>
               <a:ext uri="{FF2B5EF4-FFF2-40B4-BE49-F238E27FC236}">
-                <a16:creationId xmlns:a16="http://schemas.microsoft.com/office/drawing/2014/main" xmlns="" id="{0B6697B4-1AD9-4089-92FD-6CFE29B6E807}"/>
+                <a16:creationId xmlns="" xmlns:a16="http://schemas.microsoft.com/office/drawing/2014/main" id="{0B6697B4-1AD9-4089-92FD-6CFE29B6E807}"/>
               </a:ext>
             </a:extLst>
           </p:cNvPr>
@@ -8510,7 +8523,6 @@
               <a:rPr lang="de-DE" sz="3600" dirty="0"/>
               <a:t>Evolution des Systems</a:t>
             </a:r>
-            <a:endParaRPr lang="de-DE" sz="3600" dirty="0"/>
           </a:p>
         </p:txBody>
       </p:sp>
@@ -8568,7 +8580,15 @@
           <a:p>
             <a:r>
               <a:rPr lang="de-DE" dirty="0" smtClean="0"/>
-              <a:t>Erstmal rechne ich reflektVector des ankommenden Strahl von Objekt, und dann werden alle Lichten und Schatten mit raytrace rekursiv nochmal rechnen:</a:t>
+              <a:t>Erstmal rechne ich reflektVector des ankommenden </a:t>
+            </a:r>
+            <a:r>
+              <a:rPr lang="de-DE" dirty="0" smtClean="0"/>
+              <a:t>Strahls </a:t>
+            </a:r>
+            <a:r>
+              <a:rPr lang="de-DE" dirty="0" smtClean="0"/>
+              <a:t>von Objekt, und dann werden alle Lichten und Schatten mit raytrace rekursiv nochmal rechnen:</a:t>
             </a:r>
             <a:endParaRPr lang="de-DE" dirty="0"/>
           </a:p>
@@ -8735,7 +8755,7 @@
           <p:cNvPr id="2" name="Date Placeholder 2">
             <a:extLst>
               <a:ext uri="{FF2B5EF4-FFF2-40B4-BE49-F238E27FC236}">
-                <a16:creationId xmlns:a16="http://schemas.microsoft.com/office/drawing/2014/main" xmlns="" id="{180FC470-B565-4FB6-B0D5-7C8F5744990B}"/>
+                <a16:creationId xmlns="" xmlns:a16="http://schemas.microsoft.com/office/drawing/2014/main" id="{180FC470-B565-4FB6-B0D5-7C8F5744990B}"/>
               </a:ext>
             </a:extLst>
           </p:cNvPr>
@@ -8780,11 +8800,7 @@
             </a:r>
             <a:r>
               <a:rPr lang="en-IN" dirty="0" smtClean="0"/>
-              <a:t> Dang</a:t>
-            </a:r>
-            <a:r>
-              <a:rPr lang="en-IN" dirty="0" smtClean="0"/>
-              <a:t>, </a:t>
+              <a:t> Dang, </a:t>
             </a:r>
             <a:r>
               <a:rPr lang="en-IN" dirty="0" err="1" smtClean="0"/>
@@ -8832,7 +8848,7 @@
           <p:cNvPr id="3" name="Footer Placeholder 3">
             <a:extLst>
               <a:ext uri="{FF2B5EF4-FFF2-40B4-BE49-F238E27FC236}">
-                <a16:creationId xmlns:a16="http://schemas.microsoft.com/office/drawing/2014/main" xmlns="" id="{AA1A078D-2DA1-41AC-A894-48E19FF3FAE3}"/>
+                <a16:creationId xmlns="" xmlns:a16="http://schemas.microsoft.com/office/drawing/2014/main" id="{AA1A078D-2DA1-41AC-A894-48E19FF3FAE3}"/>
               </a:ext>
             </a:extLst>
           </p:cNvPr>
@@ -8899,7 +8915,7 @@
           <p:cNvPr id="4" name="Date Placeholder 2">
             <a:extLst>
               <a:ext uri="{FF2B5EF4-FFF2-40B4-BE49-F238E27FC236}">
-                <a16:creationId xmlns:a16="http://schemas.microsoft.com/office/drawing/2014/main" xmlns="" id="{254BB5F0-2280-4072-A92F-9321101FB009}"/>
+                <a16:creationId xmlns="" xmlns:a16="http://schemas.microsoft.com/office/drawing/2014/main" id="{254BB5F0-2280-4072-A92F-9321101FB009}"/>
               </a:ext>
             </a:extLst>
           </p:cNvPr>
@@ -9035,7 +9051,7 @@
           <p:cNvPr id="5" name="Straight Connector 4">
             <a:extLst>
               <a:ext uri="{FF2B5EF4-FFF2-40B4-BE49-F238E27FC236}">
-                <a16:creationId xmlns:a16="http://schemas.microsoft.com/office/drawing/2014/main" xmlns="" id="{0B6697B4-1AD9-4089-92FD-6CFE29B6E807}"/>
+                <a16:creationId xmlns="" xmlns:a16="http://schemas.microsoft.com/office/drawing/2014/main" id="{0B6697B4-1AD9-4089-92FD-6CFE29B6E807}"/>
               </a:ext>
             </a:extLst>
           </p:cNvPr>
@@ -9262,7 +9278,6 @@
               <a:rPr lang="de-DE" sz="3600" dirty="0"/>
               <a:t>Evolution des Systems</a:t>
             </a:r>
-            <a:endParaRPr lang="de-DE" sz="3600" dirty="0"/>
           </a:p>
         </p:txBody>
       </p:sp>
@@ -9305,7 +9320,7 @@
         <p:spPr>
           <a:xfrm>
             <a:off x="401470" y="1799970"/>
-            <a:ext cx="8391970" cy="1200329"/>
+            <a:ext cx="8391970" cy="923330"/>
           </a:xfrm>
           <a:prstGeom prst="rect">
             <a:avLst/>
@@ -9340,9 +9355,16 @@
             </a:r>
             <a:r>
               <a:rPr lang="de-DE" dirty="0"/>
-              <a:t>also von digitalen Bildern mit hohem Helligkeitsumfang. Beim Tone Mapping wird der Kontrastumfang eines Hochkontrastbildes verringert, um es auf herkömmlichen Ausgabegeräten darstellen zu können.</a:t>
-            </a:r>
-            <a:endParaRPr lang="de-DE" dirty="0"/>
+              <a:t>also von digitalen Bildern mit hohem Helligkeitsumfang. Beim Tone Mapping wird der Kontrastumfang </a:t>
+            </a:r>
+            <a:r>
+              <a:rPr lang="de-DE" dirty="0" smtClean="0"/>
+              <a:t>verringert</a:t>
+            </a:r>
+            <a:r>
+              <a:rPr lang="de-DE" dirty="0"/>
+              <a:t>, um es auf herkömmlichen Ausgabegeräten darstellen zu können.</a:t>
+            </a:r>
           </a:p>
         </p:txBody>
       </p:sp>
@@ -9458,7 +9480,7 @@
         </p:blipFill>
         <p:spPr>
           <a:xfrm>
-            <a:off x="7406488" y="3284282"/>
+            <a:off x="7406488" y="3262709"/>
             <a:ext cx="3822962" cy="2816474"/>
           </a:xfrm>
           <a:prstGeom prst="rect">

</xml_diff>